<commit_message>
added instructor pdf slides
</commit_message>
<xml_diff>
--- a/Counter_Malign_Information/4-Implement-For_Instructors/Lesson_Plans/Lesson_05-Identify_Malign_Information/Audio_Visual-Identify_Misinformation/En-Lesson_Slide-Identify_Misinformation.pptx
+++ b/Counter_Malign_Information/4-Implement-For_Instructors/Lesson_Plans/Lesson_05-Identify_Malign_Information/Audio_Visual-Identify_Misinformation/En-Lesson_Slide-Identify_Misinformation.pptx
@@ -6,7 +6,7 @@
     <p:sldMasterId id="2147483675" r:id="rId2"/>
   </p:sldMasterIdLst>
   <p:notesMasterIdLst>
-    <p:notesMasterId r:id="rId27"/>
+    <p:notesMasterId r:id="rId28"/>
   </p:notesMasterIdLst>
   <p:sldIdLst>
     <p:sldId id="383" r:id="rId3"/>
@@ -31,8 +31,9 @@
     <p:sldId id="624" r:id="rId22"/>
     <p:sldId id="640" r:id="rId23"/>
     <p:sldId id="641" r:id="rId24"/>
-    <p:sldId id="269" r:id="rId25"/>
-    <p:sldId id="271" r:id="rId26"/>
+    <p:sldId id="642" r:id="rId25"/>
+    <p:sldId id="269" r:id="rId26"/>
+    <p:sldId id="271" r:id="rId27"/>
   </p:sldIdLst>
   <p:sldSz cx="12192000" cy="6858000"/>
   <p:notesSz cx="6858000" cy="9144000"/>
@@ -2204,9 +2205,750 @@
           <a:lstStyle/>
           <a:p>
             <a:r>
-              <a:rPr lang="en-US" dirty="0"/>
-              <a:t>Spanish version</a:t>
-            </a:r>
+              <a:rPr lang="en-US" b="0" dirty="0">
+                <a:solidFill>
+                  <a:srgbClr val="6796E6"/>
+                </a:solidFill>
+                <a:effectLst/>
+                <a:highlight>
+                  <a:srgbClr val="1F1F1F"/>
+                </a:highlight>
+                <a:latin typeface="Menlo" panose="020B0609030804020204" pitchFamily="49" charset="0"/>
+              </a:rPr>
+              <a:t>1.</a:t>
+            </a:r>
+            <a:r>
+              <a:rPr lang="en-US" b="0" dirty="0">
+                <a:solidFill>
+                  <a:srgbClr val="CCCCCC"/>
+                </a:solidFill>
+                <a:effectLst/>
+                <a:highlight>
+                  <a:srgbClr val="1F1F1F"/>
+                </a:highlight>
+                <a:latin typeface="Menlo" panose="020B0609030804020204" pitchFamily="49" charset="0"/>
+              </a:rPr>
+              <a:t> Beebe, S. M., &amp; </a:t>
+            </a:r>
+            <a:r>
+              <a:rPr lang="en-US" b="0" dirty="0" err="1">
+                <a:solidFill>
+                  <a:srgbClr val="CCCCCC"/>
+                </a:solidFill>
+                <a:effectLst/>
+                <a:highlight>
+                  <a:srgbClr val="1F1F1F"/>
+                </a:highlight>
+                <a:latin typeface="Menlo" panose="020B0609030804020204" pitchFamily="49" charset="0"/>
+              </a:rPr>
+              <a:t>Pherson</a:t>
+            </a:r>
+            <a:r>
+              <a:rPr lang="en-US" b="0" dirty="0">
+                <a:solidFill>
+                  <a:srgbClr val="CCCCCC"/>
+                </a:solidFill>
+                <a:effectLst/>
+                <a:highlight>
+                  <a:srgbClr val="1F1F1F"/>
+                </a:highlight>
+                <a:latin typeface="Menlo" panose="020B0609030804020204" pitchFamily="49" charset="0"/>
+              </a:rPr>
+              <a:t>, R. H. (2015). </a:t>
+            </a:r>
+            <a:r>
+              <a:rPr lang="en-US" b="0" i="1" dirty="0">
+                <a:solidFill>
+                  <a:srgbClr val="CCCCCC"/>
+                </a:solidFill>
+                <a:effectLst/>
+                <a:highlight>
+                  <a:srgbClr val="1F1F1F"/>
+                </a:highlight>
+                <a:latin typeface="Menlo" panose="020B0609030804020204" pitchFamily="49" charset="0"/>
+              </a:rPr>
+              <a:t>*Cases in Intelligence Analysis: Structured Analytic Techniques in Action*</a:t>
+            </a:r>
+            <a:r>
+              <a:rPr lang="en-US" b="0" dirty="0">
+                <a:solidFill>
+                  <a:srgbClr val="CCCCCC"/>
+                </a:solidFill>
+                <a:effectLst/>
+                <a:highlight>
+                  <a:srgbClr val="1F1F1F"/>
+                </a:highlight>
+                <a:latin typeface="Menlo" panose="020B0609030804020204" pitchFamily="49" charset="0"/>
+              </a:rPr>
+              <a:t>.</a:t>
+            </a:r>
+          </a:p>
+          <a:p>
+            <a:r>
+              <a:rPr lang="en-US" b="0" dirty="0">
+                <a:solidFill>
+                  <a:srgbClr val="6796E6"/>
+                </a:solidFill>
+                <a:effectLst/>
+                <a:highlight>
+                  <a:srgbClr val="1F1F1F"/>
+                </a:highlight>
+                <a:latin typeface="Menlo" panose="020B0609030804020204" pitchFamily="49" charset="0"/>
+              </a:rPr>
+              <a:t>2.</a:t>
+            </a:r>
+            <a:r>
+              <a:rPr lang="en-US" b="0" dirty="0">
+                <a:solidFill>
+                  <a:srgbClr val="CCCCCC"/>
+                </a:solidFill>
+                <a:effectLst/>
+                <a:highlight>
+                  <a:srgbClr val="1F1F1F"/>
+                </a:highlight>
+                <a:latin typeface="Menlo" panose="020B0609030804020204" pitchFamily="49" charset="0"/>
+              </a:rPr>
+              <a:t> </a:t>
+            </a:r>
+            <a:r>
+              <a:rPr lang="en-US" b="0" dirty="0" err="1">
+                <a:solidFill>
+                  <a:srgbClr val="CCCCCC"/>
+                </a:solidFill>
+                <a:effectLst/>
+                <a:highlight>
+                  <a:srgbClr val="1F1F1F"/>
+                </a:highlight>
+                <a:latin typeface="Menlo" panose="020B0609030804020204" pitchFamily="49" charset="0"/>
+              </a:rPr>
+              <a:t>Pherson</a:t>
+            </a:r>
+            <a:r>
+              <a:rPr lang="en-US" b="0" dirty="0">
+                <a:solidFill>
+                  <a:srgbClr val="CCCCCC"/>
+                </a:solidFill>
+                <a:effectLst/>
+                <a:highlight>
+                  <a:srgbClr val="1F1F1F"/>
+                </a:highlight>
+                <a:latin typeface="Menlo" panose="020B0609030804020204" pitchFamily="49" charset="0"/>
+              </a:rPr>
+              <a:t>, R. H., &amp; Heuer, R. J. (2021). </a:t>
+            </a:r>
+            <a:r>
+              <a:rPr lang="en-US" b="0" i="1" dirty="0">
+                <a:solidFill>
+                  <a:srgbClr val="CCCCCC"/>
+                </a:solidFill>
+                <a:effectLst/>
+                <a:highlight>
+                  <a:srgbClr val="1F1F1F"/>
+                </a:highlight>
+                <a:latin typeface="Menlo" panose="020B0609030804020204" pitchFamily="49" charset="0"/>
+              </a:rPr>
+              <a:t>*Structured Analytic Techniques for Intelligence Analysis*</a:t>
+            </a:r>
+            <a:r>
+              <a:rPr lang="en-US" b="0" dirty="0">
+                <a:solidFill>
+                  <a:srgbClr val="CCCCCC"/>
+                </a:solidFill>
+                <a:effectLst/>
+                <a:highlight>
+                  <a:srgbClr val="1F1F1F"/>
+                </a:highlight>
+                <a:latin typeface="Menlo" panose="020B0609030804020204" pitchFamily="49" charset="0"/>
+              </a:rPr>
+              <a:t>.</a:t>
+            </a:r>
+          </a:p>
+          <a:p>
+            <a:r>
+              <a:rPr lang="en-US" b="0" dirty="0">
+                <a:solidFill>
+                  <a:srgbClr val="6796E6"/>
+                </a:solidFill>
+                <a:effectLst/>
+                <a:highlight>
+                  <a:srgbClr val="1F1F1F"/>
+                </a:highlight>
+                <a:latin typeface="Menlo" panose="020B0609030804020204" pitchFamily="49" charset="0"/>
+              </a:rPr>
+              <a:t>3.</a:t>
+            </a:r>
+            <a:r>
+              <a:rPr lang="en-US" b="0" dirty="0">
+                <a:solidFill>
+                  <a:srgbClr val="CCCCCC"/>
+                </a:solidFill>
+                <a:effectLst/>
+                <a:highlight>
+                  <a:srgbClr val="1F1F1F"/>
+                </a:highlight>
+                <a:latin typeface="Menlo" panose="020B0609030804020204" pitchFamily="49" charset="0"/>
+              </a:rPr>
+              <a:t> China Diplomatic X account - https://</a:t>
+            </a:r>
+            <a:r>
+              <a:rPr lang="en-US" b="0" dirty="0" err="1">
+                <a:solidFill>
+                  <a:srgbClr val="CCCCCC"/>
+                </a:solidFill>
+                <a:effectLst/>
+                <a:highlight>
+                  <a:srgbClr val="1F1F1F"/>
+                </a:highlight>
+                <a:latin typeface="Menlo" panose="020B0609030804020204" pitchFamily="49" charset="0"/>
+              </a:rPr>
+              <a:t>x.com</a:t>
+            </a:r>
+            <a:r>
+              <a:rPr lang="en-US" b="0" dirty="0">
+                <a:solidFill>
+                  <a:srgbClr val="CCCCCC"/>
+                </a:solidFill>
+                <a:effectLst/>
+                <a:highlight>
+                  <a:srgbClr val="1F1F1F"/>
+                </a:highlight>
+                <a:latin typeface="Menlo" panose="020B0609030804020204" pitchFamily="49" charset="0"/>
+              </a:rPr>
+              <a:t>/</a:t>
+            </a:r>
+            <a:r>
+              <a:rPr lang="en-US" b="0" dirty="0" err="1">
+                <a:solidFill>
+                  <a:srgbClr val="CCCCCC"/>
+                </a:solidFill>
+                <a:effectLst/>
+                <a:highlight>
+                  <a:srgbClr val="1F1F1F"/>
+                </a:highlight>
+                <a:latin typeface="Menlo" panose="020B0609030804020204" pitchFamily="49" charset="0"/>
+              </a:rPr>
+              <a:t>China_Panama</a:t>
+            </a:r>
+            <a:endParaRPr lang="en-US" b="0" dirty="0">
+              <a:solidFill>
+                <a:srgbClr val="CCCCCC"/>
+              </a:solidFill>
+              <a:effectLst/>
+              <a:highlight>
+                <a:srgbClr val="1F1F1F"/>
+              </a:highlight>
+              <a:latin typeface="Menlo" panose="020B0609030804020204" pitchFamily="49" charset="0"/>
+            </a:endParaRPr>
+          </a:p>
+          <a:p>
+            <a:r>
+              <a:rPr lang="en-US" b="0" dirty="0">
+                <a:solidFill>
+                  <a:srgbClr val="6796E6"/>
+                </a:solidFill>
+                <a:effectLst/>
+                <a:highlight>
+                  <a:srgbClr val="1F1F1F"/>
+                </a:highlight>
+                <a:latin typeface="Menlo" panose="020B0609030804020204" pitchFamily="49" charset="0"/>
+              </a:rPr>
+              <a:t>4.</a:t>
+            </a:r>
+            <a:r>
+              <a:rPr lang="en-US" b="0" dirty="0">
+                <a:solidFill>
+                  <a:srgbClr val="CCCCCC"/>
+                </a:solidFill>
+                <a:effectLst/>
+                <a:highlight>
+                  <a:srgbClr val="1F1F1F"/>
+                </a:highlight>
+                <a:latin typeface="Menlo" panose="020B0609030804020204" pitchFamily="49" charset="0"/>
+              </a:rPr>
+              <a:t> BEIJING'S GLOBAL MEDIA INFLUENCE 2022 - https://</a:t>
+            </a:r>
+            <a:r>
+              <a:rPr lang="en-US" b="0" dirty="0" err="1">
+                <a:solidFill>
+                  <a:srgbClr val="CCCCCC"/>
+                </a:solidFill>
+                <a:effectLst/>
+                <a:highlight>
+                  <a:srgbClr val="1F1F1F"/>
+                </a:highlight>
+                <a:latin typeface="Menlo" panose="020B0609030804020204" pitchFamily="49" charset="0"/>
+              </a:rPr>
+              <a:t>freedomhouse.org</a:t>
+            </a:r>
+            <a:r>
+              <a:rPr lang="en-US" b="0" dirty="0">
+                <a:solidFill>
+                  <a:srgbClr val="CCCCCC"/>
+                </a:solidFill>
+                <a:effectLst/>
+                <a:highlight>
+                  <a:srgbClr val="1F1F1F"/>
+                </a:highlight>
+                <a:latin typeface="Menlo" panose="020B0609030804020204" pitchFamily="49" charset="0"/>
+              </a:rPr>
+              <a:t>/country/</a:t>
+            </a:r>
+            <a:r>
+              <a:rPr lang="en-US" b="0" dirty="0" err="1">
+                <a:solidFill>
+                  <a:srgbClr val="CCCCCC"/>
+                </a:solidFill>
+                <a:effectLst/>
+                <a:highlight>
+                  <a:srgbClr val="1F1F1F"/>
+                </a:highlight>
+                <a:latin typeface="Menlo" panose="020B0609030804020204" pitchFamily="49" charset="0"/>
+              </a:rPr>
+              <a:t>panama</a:t>
+            </a:r>
+            <a:r>
+              <a:rPr lang="en-US" b="0" dirty="0">
+                <a:solidFill>
+                  <a:srgbClr val="CCCCCC"/>
+                </a:solidFill>
+                <a:effectLst/>
+                <a:highlight>
+                  <a:srgbClr val="1F1F1F"/>
+                </a:highlight>
+                <a:latin typeface="Menlo" panose="020B0609030804020204" pitchFamily="49" charset="0"/>
+              </a:rPr>
+              <a:t>/</a:t>
+            </a:r>
+            <a:r>
+              <a:rPr lang="en-US" b="0" dirty="0" err="1">
+                <a:solidFill>
+                  <a:srgbClr val="CCCCCC"/>
+                </a:solidFill>
+                <a:effectLst/>
+                <a:highlight>
+                  <a:srgbClr val="1F1F1F"/>
+                </a:highlight>
+                <a:latin typeface="Menlo" panose="020B0609030804020204" pitchFamily="49" charset="0"/>
+              </a:rPr>
+              <a:t>beijings</a:t>
+            </a:r>
+            <a:r>
+              <a:rPr lang="en-US" b="0" dirty="0">
+                <a:solidFill>
+                  <a:srgbClr val="CCCCCC"/>
+                </a:solidFill>
+                <a:effectLst/>
+                <a:highlight>
+                  <a:srgbClr val="1F1F1F"/>
+                </a:highlight>
+                <a:latin typeface="Menlo" panose="020B0609030804020204" pitchFamily="49" charset="0"/>
+              </a:rPr>
+              <a:t>-global-media-influence/2022#footnote3_a2zuib0</a:t>
+            </a:r>
+          </a:p>
+          <a:p>
+            <a:r>
+              <a:rPr lang="en-US" b="0" dirty="0">
+                <a:solidFill>
+                  <a:srgbClr val="6796E6"/>
+                </a:solidFill>
+                <a:effectLst/>
+                <a:highlight>
+                  <a:srgbClr val="1F1F1F"/>
+                </a:highlight>
+                <a:latin typeface="Menlo" panose="020B0609030804020204" pitchFamily="49" charset="0"/>
+              </a:rPr>
+              <a:t>5.</a:t>
+            </a:r>
+            <a:r>
+              <a:rPr lang="en-US" b="0" dirty="0">
+                <a:solidFill>
+                  <a:srgbClr val="CCCCCC"/>
+                </a:solidFill>
+                <a:effectLst/>
+                <a:highlight>
+                  <a:srgbClr val="1F1F1F"/>
+                </a:highlight>
+                <a:latin typeface="Menlo" panose="020B0609030804020204" pitchFamily="49" charset="0"/>
+              </a:rPr>
+              <a:t> China y Panamá: pro </a:t>
+            </a:r>
+            <a:r>
+              <a:rPr lang="en-US" b="0" dirty="0" err="1">
+                <a:solidFill>
+                  <a:srgbClr val="CCCCCC"/>
+                </a:solidFill>
+                <a:effectLst/>
+                <a:highlight>
+                  <a:srgbClr val="1F1F1F"/>
+                </a:highlight>
+                <a:latin typeface="Menlo" panose="020B0609030804020204" pitchFamily="49" charset="0"/>
+              </a:rPr>
+              <a:t>mutuo</a:t>
+            </a:r>
+            <a:r>
+              <a:rPr lang="en-US" b="0" dirty="0">
+                <a:solidFill>
+                  <a:srgbClr val="CCCCCC"/>
+                </a:solidFill>
+                <a:effectLst/>
+                <a:highlight>
+                  <a:srgbClr val="1F1F1F"/>
+                </a:highlight>
+                <a:latin typeface="Menlo" panose="020B0609030804020204" pitchFamily="49" charset="0"/>
+              </a:rPr>
+              <a:t> </a:t>
+            </a:r>
+            <a:r>
+              <a:rPr lang="en-US" b="0" dirty="0" err="1">
+                <a:solidFill>
+                  <a:srgbClr val="CCCCCC"/>
+                </a:solidFill>
+                <a:effectLst/>
+                <a:highlight>
+                  <a:srgbClr val="1F1F1F"/>
+                </a:highlight>
+                <a:latin typeface="Menlo" panose="020B0609030804020204" pitchFamily="49" charset="0"/>
+              </a:rPr>
+              <a:t>beneficio</a:t>
+            </a:r>
+            <a:r>
+              <a:rPr lang="en-US" b="0" dirty="0">
+                <a:solidFill>
+                  <a:srgbClr val="CCCCCC"/>
+                </a:solidFill>
+                <a:effectLst/>
+                <a:highlight>
+                  <a:srgbClr val="1F1F1F"/>
+                </a:highlight>
+                <a:latin typeface="Menlo" panose="020B0609030804020204" pitchFamily="49" charset="0"/>
+              </a:rPr>
+              <a:t> (Translated: China and Panama: for mutual benefit) - https://</a:t>
+            </a:r>
+            <a:r>
+              <a:rPr lang="en-US" b="0" dirty="0" err="1">
+                <a:solidFill>
+                  <a:srgbClr val="CCCCCC"/>
+                </a:solidFill>
+                <a:effectLst/>
+                <a:highlight>
+                  <a:srgbClr val="1F1F1F"/>
+                </a:highlight>
+                <a:latin typeface="Menlo" panose="020B0609030804020204" pitchFamily="49" charset="0"/>
+              </a:rPr>
+              <a:t>www.laestrella.com.pa</a:t>
+            </a:r>
+            <a:r>
+              <a:rPr lang="en-US" b="0" dirty="0">
+                <a:solidFill>
+                  <a:srgbClr val="CCCCCC"/>
+                </a:solidFill>
+                <a:effectLst/>
+                <a:highlight>
+                  <a:srgbClr val="1F1F1F"/>
+                </a:highlight>
+                <a:latin typeface="Menlo" panose="020B0609030804020204" pitchFamily="49" charset="0"/>
+              </a:rPr>
+              <a:t>/opinion/</a:t>
+            </a:r>
+            <a:r>
+              <a:rPr lang="en-US" b="0" dirty="0" err="1">
+                <a:solidFill>
+                  <a:srgbClr val="CCCCCC"/>
+                </a:solidFill>
+                <a:effectLst/>
+                <a:highlight>
+                  <a:srgbClr val="1F1F1F"/>
+                </a:highlight>
+                <a:latin typeface="Menlo" panose="020B0609030804020204" pitchFamily="49" charset="0"/>
+              </a:rPr>
+              <a:t>columnistas</a:t>
+            </a:r>
+            <a:r>
+              <a:rPr lang="en-US" b="0" dirty="0">
+                <a:solidFill>
+                  <a:srgbClr val="CCCCCC"/>
+                </a:solidFill>
+                <a:effectLst/>
+                <a:highlight>
+                  <a:srgbClr val="1F1F1F"/>
+                </a:highlight>
+                <a:latin typeface="Menlo" panose="020B0609030804020204" pitchFamily="49" charset="0"/>
+              </a:rPr>
+              <a:t>/pro-china-mutuo-panama-EJLE2547</a:t>
+            </a:r>
+          </a:p>
+          <a:p>
+            <a:r>
+              <a:rPr lang="en-US" b="0" dirty="0">
+                <a:solidFill>
+                  <a:srgbClr val="6796E6"/>
+                </a:solidFill>
+                <a:effectLst/>
+                <a:highlight>
+                  <a:srgbClr val="1F1F1F"/>
+                </a:highlight>
+                <a:latin typeface="Menlo" panose="020B0609030804020204" pitchFamily="49" charset="0"/>
+              </a:rPr>
+              <a:t>6.</a:t>
+            </a:r>
+            <a:r>
+              <a:rPr lang="en-US" b="0" dirty="0">
+                <a:solidFill>
+                  <a:srgbClr val="CCCCCC"/>
+                </a:solidFill>
+                <a:effectLst/>
+                <a:highlight>
+                  <a:srgbClr val="1F1F1F"/>
+                </a:highlight>
+                <a:latin typeface="Menlo" panose="020B0609030804020204" pitchFamily="49" charset="0"/>
+              </a:rPr>
+              <a:t> Misleading a Pandemic: The Viral Effects of Chinese Propaganda and the Coronavirus - https://</a:t>
+            </a:r>
+            <a:r>
+              <a:rPr lang="en-US" b="0" dirty="0" err="1">
+                <a:solidFill>
+                  <a:srgbClr val="CCCCCC"/>
+                </a:solidFill>
+                <a:effectLst/>
+                <a:highlight>
+                  <a:srgbClr val="1F1F1F"/>
+                </a:highlight>
+                <a:latin typeface="Menlo" panose="020B0609030804020204" pitchFamily="49" charset="0"/>
+              </a:rPr>
+              <a:t>ndupress.ndu.edu</a:t>
+            </a:r>
+            <a:r>
+              <a:rPr lang="en-US" b="0" dirty="0">
+                <a:solidFill>
+                  <a:srgbClr val="CCCCCC"/>
+                </a:solidFill>
+                <a:effectLst/>
+                <a:highlight>
+                  <a:srgbClr val="1F1F1F"/>
+                </a:highlight>
+                <a:latin typeface="Menlo" panose="020B0609030804020204" pitchFamily="49" charset="0"/>
+              </a:rPr>
+              <a:t>/Media/News/News-Article-View/Article/2884217/misleading-a-pandemic-the-viral-effects-of-chinese-propaganda-and-the-coronavir/</a:t>
+            </a:r>
+          </a:p>
+          <a:p>
+            <a:r>
+              <a:rPr lang="en-US" b="0" dirty="0">
+                <a:solidFill>
+                  <a:srgbClr val="6796E6"/>
+                </a:solidFill>
+                <a:effectLst/>
+                <a:highlight>
+                  <a:srgbClr val="1F1F1F"/>
+                </a:highlight>
+                <a:latin typeface="Menlo" panose="020B0609030804020204" pitchFamily="49" charset="0"/>
+              </a:rPr>
+              <a:t>7.</a:t>
+            </a:r>
+            <a:r>
+              <a:rPr lang="en-US" b="0" dirty="0">
+                <a:solidFill>
+                  <a:srgbClr val="CCCCCC"/>
+                </a:solidFill>
+                <a:effectLst/>
+                <a:highlight>
+                  <a:srgbClr val="1F1F1F"/>
+                </a:highlight>
+                <a:latin typeface="Menlo" panose="020B0609030804020204" pitchFamily="49" charset="0"/>
+              </a:rPr>
+              <a:t> A disinformation and propaganda campaign “that denies and downplays the severity of the incident is growing” - https://</a:t>
+            </a:r>
+            <a:r>
+              <a:rPr lang="en-US" b="0" dirty="0" err="1">
+                <a:solidFill>
+                  <a:srgbClr val="CCCCCC"/>
+                </a:solidFill>
+                <a:effectLst/>
+                <a:highlight>
+                  <a:srgbClr val="1F1F1F"/>
+                </a:highlight>
+                <a:latin typeface="Menlo" panose="020B0609030804020204" pitchFamily="49" charset="0"/>
+              </a:rPr>
+              <a:t>hongkongfp.com</a:t>
+            </a:r>
+            <a:r>
+              <a:rPr lang="en-US" b="0" dirty="0">
+                <a:solidFill>
+                  <a:srgbClr val="CCCCCC"/>
+                </a:solidFill>
+                <a:effectLst/>
+                <a:highlight>
+                  <a:srgbClr val="1F1F1F"/>
+                </a:highlight>
+                <a:latin typeface="Menlo" panose="020B0609030804020204" pitchFamily="49" charset="0"/>
+              </a:rPr>
+              <a:t>/2021/06/04/taiwan-group-launches-website-to-counter-tiananmen-massacre-trolls-and-denialism/</a:t>
+            </a:r>
+          </a:p>
+          <a:p>
+            <a:r>
+              <a:rPr lang="en-US" b="0" dirty="0">
+                <a:solidFill>
+                  <a:srgbClr val="6796E6"/>
+                </a:solidFill>
+                <a:effectLst/>
+                <a:highlight>
+                  <a:srgbClr val="1F1F1F"/>
+                </a:highlight>
+                <a:latin typeface="Menlo" panose="020B0609030804020204" pitchFamily="49" charset="0"/>
+              </a:rPr>
+              <a:t>8.</a:t>
+            </a:r>
+            <a:r>
+              <a:rPr lang="en-US" b="0" dirty="0">
+                <a:solidFill>
+                  <a:srgbClr val="CCCCCC"/>
+                </a:solidFill>
+                <a:effectLst/>
+                <a:highlight>
+                  <a:srgbClr val="1F1F1F"/>
+                </a:highlight>
+                <a:latin typeface="Menlo" panose="020B0609030804020204" pitchFamily="49" charset="0"/>
+              </a:rPr>
+              <a:t> Factsheet 4: Types of Misinformation and Disinformation - https://</a:t>
+            </a:r>
+            <a:r>
+              <a:rPr lang="en-US" b="0" dirty="0" err="1">
+                <a:solidFill>
+                  <a:srgbClr val="CCCCCC"/>
+                </a:solidFill>
+                <a:effectLst/>
+                <a:highlight>
+                  <a:srgbClr val="1F1F1F"/>
+                </a:highlight>
+                <a:latin typeface="Menlo" panose="020B0609030804020204" pitchFamily="49" charset="0"/>
+              </a:rPr>
+              <a:t>www.unhcr.org</a:t>
+            </a:r>
+            <a:r>
+              <a:rPr lang="en-US" b="0" dirty="0">
+                <a:solidFill>
+                  <a:srgbClr val="CCCCCC"/>
+                </a:solidFill>
+                <a:effectLst/>
+                <a:highlight>
+                  <a:srgbClr val="1F1F1F"/>
+                </a:highlight>
+                <a:latin typeface="Menlo" panose="020B0609030804020204" pitchFamily="49" charset="0"/>
+              </a:rPr>
+              <a:t>/innovation/wp-content/uploads/2022/02/Factsheet-4.pdf</a:t>
+            </a:r>
+          </a:p>
+          <a:p>
+            <a:r>
+              <a:rPr lang="en-US" b="0" dirty="0">
+                <a:solidFill>
+                  <a:srgbClr val="6796E6"/>
+                </a:solidFill>
+                <a:effectLst/>
+                <a:highlight>
+                  <a:srgbClr val="1F1F1F"/>
+                </a:highlight>
+                <a:latin typeface="Menlo" panose="020B0609030804020204" pitchFamily="49" charset="0"/>
+              </a:rPr>
+              <a:t>9.</a:t>
+            </a:r>
+            <a:r>
+              <a:rPr lang="en-US" b="0" dirty="0">
+                <a:solidFill>
+                  <a:srgbClr val="CCCCCC"/>
+                </a:solidFill>
+                <a:effectLst/>
+                <a:highlight>
+                  <a:srgbClr val="1F1F1F"/>
+                </a:highlight>
+                <a:latin typeface="Menlo" panose="020B0609030804020204" pitchFamily="49" charset="0"/>
+              </a:rPr>
+              <a:t> CWU Disinformation Case Studies - https://</a:t>
+            </a:r>
+            <a:r>
+              <a:rPr lang="en-US" b="0" dirty="0" err="1">
+                <a:solidFill>
+                  <a:srgbClr val="CCCCCC"/>
+                </a:solidFill>
+                <a:effectLst/>
+                <a:highlight>
+                  <a:srgbClr val="1F1F1F"/>
+                </a:highlight>
+                <a:latin typeface="Menlo" panose="020B0609030804020204" pitchFamily="49" charset="0"/>
+              </a:rPr>
+              <a:t>libguides.lib.cwu.edu</a:t>
+            </a:r>
+            <a:r>
+              <a:rPr lang="en-US" b="0" dirty="0">
+                <a:solidFill>
+                  <a:srgbClr val="CCCCCC"/>
+                </a:solidFill>
+                <a:effectLst/>
+                <a:highlight>
+                  <a:srgbClr val="1F1F1F"/>
+                </a:highlight>
+                <a:latin typeface="Menlo" panose="020B0609030804020204" pitchFamily="49" charset="0"/>
+              </a:rPr>
+              <a:t>/</a:t>
+            </a:r>
+            <a:r>
+              <a:rPr lang="en-US" b="0" dirty="0" err="1">
+                <a:solidFill>
+                  <a:srgbClr val="CCCCCC"/>
+                </a:solidFill>
+                <a:effectLst/>
+                <a:highlight>
+                  <a:srgbClr val="1F1F1F"/>
+                </a:highlight>
+                <a:latin typeface="Menlo" panose="020B0609030804020204" pitchFamily="49" charset="0"/>
+              </a:rPr>
+              <a:t>c.php?g</a:t>
+            </a:r>
+            <a:r>
+              <a:rPr lang="en-US" b="0" dirty="0">
+                <a:solidFill>
+                  <a:srgbClr val="CCCCCC"/>
+                </a:solidFill>
+                <a:effectLst/>
+                <a:highlight>
+                  <a:srgbClr val="1F1F1F"/>
+                </a:highlight>
+                <a:latin typeface="Menlo" panose="020B0609030804020204" pitchFamily="49" charset="0"/>
+              </a:rPr>
+              <a:t>=625394&amp;p=4391900 </a:t>
+            </a:r>
+          </a:p>
+          <a:p>
+            <a:br>
+              <a:rPr lang="en-US" b="0" dirty="0">
+                <a:solidFill>
+                  <a:srgbClr val="CCCCCC"/>
+                </a:solidFill>
+                <a:effectLst/>
+                <a:highlight>
+                  <a:srgbClr val="1F1F1F"/>
+                </a:highlight>
+                <a:latin typeface="Menlo" panose="020B0609030804020204" pitchFamily="49" charset="0"/>
+              </a:rPr>
+            </a:br>
+            <a:endParaRPr lang="en-US" b="0" dirty="0">
+              <a:solidFill>
+                <a:srgbClr val="CCCCCC"/>
+              </a:solidFill>
+              <a:effectLst/>
+              <a:highlight>
+                <a:srgbClr val="1F1F1F"/>
+              </a:highlight>
+              <a:latin typeface="Menlo" panose="020B0609030804020204" pitchFamily="49" charset="0"/>
+            </a:endParaRPr>
+          </a:p>
+          <a:p>
+            <a:endParaRPr lang="en-US"/>
+          </a:p>
+          <a:p>
+            <a:endParaRPr lang="en-US"/>
           </a:p>
         </p:txBody>
       </p:sp>
@@ -2249,7 +2991,7 @@
     </p:spTree>
     <p:extLst>
       <p:ext uri="{BB962C8B-B14F-4D97-AF65-F5344CB8AC3E}">
-        <p14:creationId xmlns:p14="http://schemas.microsoft.com/office/powerpoint/2010/main" val="1662411302"/>
+        <p14:creationId xmlns:p14="http://schemas.microsoft.com/office/powerpoint/2010/main" val="2014150389"/>
       </p:ext>
     </p:extLst>
   </p:cSld>
@@ -2341,6 +3083,111 @@
                 <a:latin typeface="Times New Roman"/>
               </a:rPr>
               <a:t>24</a:t>
+            </a:fld>
+            <a:endParaRPr lang="en-US" sz="1400" b="0" strike="noStrike" spc="-1">
+              <a:solidFill>
+                <a:srgbClr val="000000"/>
+              </a:solidFill>
+              <a:latin typeface="Times New Roman"/>
+            </a:endParaRPr>
+          </a:p>
+        </p:txBody>
+      </p:sp>
+    </p:spTree>
+    <p:extLst>
+      <p:ext uri="{BB962C8B-B14F-4D97-AF65-F5344CB8AC3E}">
+        <p14:creationId xmlns:p14="http://schemas.microsoft.com/office/powerpoint/2010/main" val="1662411302"/>
+      </p:ext>
+    </p:extLst>
+  </p:cSld>
+  <p:clrMapOvr>
+    <a:masterClrMapping/>
+  </p:clrMapOvr>
+</p:notes>
+</file>
+
+<file path=ppt/notesSlides/notesSlide17.xml><?xml version="1.0" encoding="utf-8"?>
+<p:notes xmlns:a="http://schemas.openxmlformats.org/drawingml/2006/main" xmlns:r="http://schemas.openxmlformats.org/officeDocument/2006/relationships" xmlns:p="http://schemas.openxmlformats.org/presentationml/2006/main">
+  <p:cSld>
+    <p:spTree>
+      <p:nvGrpSpPr>
+        <p:cNvPr id="1" name=""/>
+        <p:cNvGrpSpPr/>
+        <p:nvPr/>
+      </p:nvGrpSpPr>
+      <p:grpSpPr>
+        <a:xfrm>
+          <a:off x="0" y="0"/>
+          <a:ext cx="0" cy="0"/>
+          <a:chOff x="0" y="0"/>
+          <a:chExt cx="0" cy="0"/>
+        </a:xfrm>
+      </p:grpSpPr>
+      <p:sp>
+        <p:nvSpPr>
+          <p:cNvPr id="2" name="Slide Image Placeholder 1"/>
+          <p:cNvSpPr>
+            <a:spLocks noGrp="1" noRot="1" noChangeAspect="1"/>
+          </p:cNvSpPr>
+          <p:nvPr>
+            <p:ph type="sldImg"/>
+          </p:nvPr>
+        </p:nvSpPr>
+        <p:spPr>
+          <a:xfrm>
+            <a:off x="382588" y="695325"/>
+            <a:ext cx="6092825" cy="3427413"/>
+          </a:xfrm>
+        </p:spPr>
+      </p:sp>
+      <p:sp>
+        <p:nvSpPr>
+          <p:cNvPr id="3" name="Notes Placeholder 2"/>
+          <p:cNvSpPr>
+            <a:spLocks noGrp="1"/>
+          </p:cNvSpPr>
+          <p:nvPr>
+            <p:ph type="body" idx="1"/>
+          </p:nvPr>
+        </p:nvSpPr>
+        <p:spPr/>
+        <p:txBody>
+          <a:bodyPr/>
+          <a:lstStyle/>
+          <a:p>
+            <a:r>
+              <a:rPr lang="en-US" dirty="0"/>
+              <a:t>Spanish version</a:t>
+            </a:r>
+          </a:p>
+        </p:txBody>
+      </p:sp>
+      <p:sp>
+        <p:nvSpPr>
+          <p:cNvPr id="4" name="Slide Number Placeholder 3"/>
+          <p:cNvSpPr>
+            <a:spLocks noGrp="1"/>
+          </p:cNvSpPr>
+          <p:nvPr>
+            <p:ph type="sldNum" idx="8"/>
+          </p:nvPr>
+        </p:nvSpPr>
+        <p:spPr/>
+        <p:txBody>
+          <a:bodyPr/>
+          <a:lstStyle/>
+          <a:p>
+            <a:pPr indent="0" algn="r">
+              <a:buNone/>
+            </a:pPr>
+            <a:fld id="{96D071C0-0F6A-4E5C-B3E5-B824FE66220F}" type="slidenum">
+              <a:rPr lang="en-US" sz="1400" b="0" strike="noStrike" spc="-1" smtClean="0">
+                <a:solidFill>
+                  <a:srgbClr val="000000"/>
+                </a:solidFill>
+                <a:latin typeface="Times New Roman"/>
+              </a:rPr>
+              <a:t>25</a:t>
             </a:fld>
             <a:endParaRPr lang="en-US" sz="1400" b="0" strike="noStrike" spc="-1">
               <a:solidFill>
@@ -8341,7 +9188,7 @@
     <p:bg>
       <p:bgPr>
         <a:solidFill>
-          <a:srgbClr val="FFFF00"/>
+          <a:schemeClr val="bg1"/>
         </a:solidFill>
         <a:effectLst/>
       </p:bgPr>
@@ -8463,7 +9310,7 @@
     <p:bg>
       <p:bgPr>
         <a:solidFill>
-          <a:srgbClr val="FFFF00"/>
+          <a:schemeClr val="bg1"/>
         </a:solidFill>
         <a:effectLst/>
       </p:bgPr>
@@ -8619,7 +9466,7 @@
     <p:bg>
       <p:bgPr>
         <a:solidFill>
-          <a:srgbClr val="FFFF00"/>
+          <a:schemeClr val="bg1"/>
         </a:solidFill>
         <a:effectLst/>
       </p:bgPr>
@@ -8759,7 +9606,7 @@
     <p:bg>
       <p:bgPr>
         <a:solidFill>
-          <a:srgbClr val="FFFF00"/>
+          <a:schemeClr val="bg1"/>
         </a:solidFill>
         <a:effectLst/>
       </p:bgPr>
@@ -8870,7 +9717,7 @@
     <p:bg>
       <p:bgPr>
         <a:solidFill>
-          <a:srgbClr val="FFFF00"/>
+          <a:schemeClr val="bg1"/>
         </a:solidFill>
         <a:effectLst/>
       </p:bgPr>
@@ -8967,7 +9814,7 @@
     <p:bg>
       <p:bgPr>
         <a:solidFill>
-          <a:srgbClr val="FFFF00"/>
+          <a:schemeClr val="bg1"/>
         </a:solidFill>
         <a:effectLst/>
       </p:bgPr>
@@ -9123,7 +9970,7 @@
     <p:bg>
       <p:bgPr>
         <a:solidFill>
-          <a:srgbClr val="FFFF00"/>
+          <a:schemeClr val="bg1"/>
         </a:solidFill>
         <a:effectLst/>
       </p:bgPr>
@@ -9279,7 +10126,7 @@
     <p:bg>
       <p:bgPr>
         <a:solidFill>
-          <a:srgbClr val="FFFF00"/>
+          <a:schemeClr val="bg1"/>
         </a:solidFill>
         <a:effectLst/>
       </p:bgPr>
@@ -9397,7 +10244,7 @@
     <p:bg>
       <p:bgPr>
         <a:solidFill>
-          <a:srgbClr val="FFFF00"/>
+          <a:schemeClr val="bg1"/>
         </a:solidFill>
         <a:effectLst/>
       </p:bgPr>
@@ -9585,7 +10432,7 @@
     <p:bg>
       <p:bgPr>
         <a:solidFill>
-          <a:srgbClr val="FFFF00"/>
+          <a:schemeClr val="bg1"/>
         </a:solidFill>
         <a:effectLst/>
       </p:bgPr>
@@ -9762,7 +10609,7 @@
     <p:bg>
       <p:bgPr>
         <a:solidFill>
-          <a:srgbClr val="FFFF00"/>
+          <a:schemeClr val="bg1"/>
         </a:solidFill>
         <a:effectLst/>
       </p:bgPr>
@@ -9985,7 +10832,7 @@
     <p:bg>
       <p:bgPr>
         <a:solidFill>
-          <a:srgbClr val="FFFF00"/>
+          <a:schemeClr val="bg1"/>
         </a:solidFill>
         <a:effectLst/>
       </p:bgPr>
@@ -10087,7 +10934,7 @@
     <p:bg>
       <p:bgPr>
         <a:solidFill>
-          <a:srgbClr val="FFFF00"/>
+          <a:schemeClr val="bg1"/>
         </a:solidFill>
         <a:effectLst/>
       </p:bgPr>
@@ -10187,7 +11034,7 @@
     <p:bg>
       <p:bgPr>
         <a:solidFill>
-          <a:srgbClr val="FFFF00"/>
+          <a:schemeClr val="bg1"/>
         </a:solidFill>
         <a:effectLst/>
       </p:bgPr>
@@ -10375,7 +11222,7 @@
     <p:bg>
       <p:bgPr>
         <a:solidFill>
-          <a:srgbClr val="FFFF00"/>
+          <a:schemeClr val="bg1"/>
         </a:solidFill>
         <a:effectLst/>
       </p:bgPr>
@@ -10512,10 +11359,198 @@
 <file path=ppt/slides/slide23.xml><?xml version="1.0" encoding="utf-8"?>
 <p:sld xmlns:a="http://schemas.openxmlformats.org/drawingml/2006/main" xmlns:r="http://schemas.openxmlformats.org/officeDocument/2006/relationships" xmlns:p="http://schemas.openxmlformats.org/presentationml/2006/main">
   <p:cSld>
+    <p:spTree>
+      <p:nvGrpSpPr>
+        <p:cNvPr id="1" name=""/>
+        <p:cNvGrpSpPr/>
+        <p:nvPr/>
+      </p:nvGrpSpPr>
+      <p:grpSpPr>
+        <a:xfrm>
+          <a:off x="0" y="0"/>
+          <a:ext cx="0" cy="0"/>
+          <a:chOff x="0" y="0"/>
+          <a:chExt cx="0" cy="0"/>
+        </a:xfrm>
+      </p:grpSpPr>
+      <p:sp>
+        <p:nvSpPr>
+          <p:cNvPr id="2" name="Title 1">
+            <a:extLst>
+              <a:ext uri="{FF2B5EF4-FFF2-40B4-BE49-F238E27FC236}">
+                <a16:creationId xmlns:a16="http://schemas.microsoft.com/office/drawing/2014/main" id="{4726FF6D-C3F9-3568-BCCE-940775C2BEF8}"/>
+              </a:ext>
+            </a:extLst>
+          </p:cNvPr>
+          <p:cNvSpPr>
+            <a:spLocks noGrp="1"/>
+          </p:cNvSpPr>
+          <p:nvPr>
+            <p:ph type="title"/>
+          </p:nvPr>
+        </p:nvSpPr>
+        <p:spPr/>
+        <p:txBody>
+          <a:bodyPr/>
+          <a:lstStyle/>
+          <a:p>
+            <a:r>
+              <a:rPr lang="en-US" dirty="0"/>
+              <a:t>References</a:t>
+            </a:r>
+          </a:p>
+        </p:txBody>
+      </p:sp>
+      <p:sp>
+        <p:nvSpPr>
+          <p:cNvPr id="3" name="Content Placeholder 2">
+            <a:extLst>
+              <a:ext uri="{FF2B5EF4-FFF2-40B4-BE49-F238E27FC236}">
+                <a16:creationId xmlns:a16="http://schemas.microsoft.com/office/drawing/2014/main" id="{119147ED-10D3-FC02-5513-71E8A318F293}"/>
+              </a:ext>
+            </a:extLst>
+          </p:cNvPr>
+          <p:cNvSpPr>
+            <a:spLocks noGrp="1"/>
+          </p:cNvSpPr>
+          <p:nvPr>
+            <p:ph idx="1"/>
+          </p:nvPr>
+        </p:nvSpPr>
+        <p:spPr/>
+        <p:txBody>
+          <a:bodyPr/>
+          <a:lstStyle/>
+          <a:p>
+            <a:r>
+              <a:rPr lang="en-US" sz="2800" dirty="0">
+                <a:solidFill>
+                  <a:srgbClr val="0E0E0E"/>
+                </a:solidFill>
+                <a:effectLst/>
+                <a:latin typeface=".SF NS"/>
+              </a:rPr>
+              <a:t>1. Beebe, S. M., &amp; </a:t>
+            </a:r>
+            <a:r>
+              <a:rPr lang="en-US" sz="2800" dirty="0" err="1">
+                <a:solidFill>
+                  <a:srgbClr val="0E0E0E"/>
+                </a:solidFill>
+                <a:effectLst/>
+                <a:latin typeface=".SF NS"/>
+              </a:rPr>
+              <a:t>Pherson</a:t>
+            </a:r>
+            <a:r>
+              <a:rPr lang="en-US" sz="2800" dirty="0">
+                <a:solidFill>
+                  <a:srgbClr val="0E0E0E"/>
+                </a:solidFill>
+                <a:effectLst/>
+                <a:latin typeface=".SF NS"/>
+              </a:rPr>
+              <a:t>, R. H. (2015). Cases in Intelligence Analysis: Structured Analytic Techniques in Action.</a:t>
+            </a:r>
+          </a:p>
+          <a:p>
+            <a:r>
+              <a:rPr lang="en-US" sz="2800" dirty="0">
+                <a:solidFill>
+                  <a:srgbClr val="0E0E0E"/>
+                </a:solidFill>
+                <a:effectLst/>
+                <a:latin typeface=".SF NS"/>
+              </a:rPr>
+              <a:t>2. </a:t>
+            </a:r>
+            <a:r>
+              <a:rPr lang="en-US" sz="2800" dirty="0" err="1">
+                <a:solidFill>
+                  <a:srgbClr val="0E0E0E"/>
+                </a:solidFill>
+                <a:effectLst/>
+                <a:latin typeface=".SF NS"/>
+              </a:rPr>
+              <a:t>Pherson</a:t>
+            </a:r>
+            <a:r>
+              <a:rPr lang="en-US" sz="2800" dirty="0">
+                <a:solidFill>
+                  <a:srgbClr val="0E0E0E"/>
+                </a:solidFill>
+                <a:effectLst/>
+                <a:latin typeface=".SF NS"/>
+              </a:rPr>
+              <a:t>, R. H., &amp; Heuer, R. J. (2021). Structured Analytic Techniques for Intelligence Analysis.</a:t>
+            </a:r>
+          </a:p>
+          <a:p>
+            <a:pPr marL="0" indent="0">
+              <a:buNone/>
+            </a:pPr>
+            <a:endParaRPr lang="en-US" dirty="0">
+              <a:solidFill>
+                <a:srgbClr val="0E0E0E"/>
+              </a:solidFill>
+              <a:latin typeface=".SF NS"/>
+            </a:endParaRPr>
+          </a:p>
+          <a:p>
+            <a:pPr marL="0" indent="0">
+              <a:buNone/>
+            </a:pPr>
+            <a:r>
+              <a:rPr lang="en-US" dirty="0">
+                <a:solidFill>
+                  <a:srgbClr val="0E0E0E"/>
+                </a:solidFill>
+                <a:latin typeface=".SF NS"/>
+              </a:rPr>
+              <a:t>See more in the notes</a:t>
+            </a:r>
+            <a:endParaRPr lang="en-US" sz="2800" dirty="0">
+              <a:solidFill>
+                <a:srgbClr val="0E0E0E"/>
+              </a:solidFill>
+              <a:effectLst/>
+              <a:latin typeface=".SF NS"/>
+            </a:endParaRPr>
+          </a:p>
+          <a:p>
+            <a:endParaRPr lang="en-US" sz="2800" dirty="0">
+              <a:solidFill>
+                <a:srgbClr val="0E0E0E"/>
+              </a:solidFill>
+              <a:effectLst/>
+              <a:latin typeface=".SF NS"/>
+            </a:endParaRPr>
+          </a:p>
+          <a:p>
+            <a:endParaRPr lang="en-US" dirty="0"/>
+          </a:p>
+        </p:txBody>
+      </p:sp>
+    </p:spTree>
+    <p:extLst>
+      <p:ext uri="{BB962C8B-B14F-4D97-AF65-F5344CB8AC3E}">
+        <p14:creationId xmlns:p14="http://schemas.microsoft.com/office/powerpoint/2010/main" val="2876037444"/>
+      </p:ext>
+    </p:extLst>
+  </p:cSld>
+  <p:clrMapOvr>
+    <a:masterClrMapping/>
+  </p:clrMapOvr>
+</p:sld>
+</file>
+
+<file path=ppt/slides/slide24.xml><?xml version="1.0" encoding="utf-8"?>
+<p:sld xmlns:a="http://schemas.openxmlformats.org/drawingml/2006/main" xmlns:r="http://schemas.openxmlformats.org/officeDocument/2006/relationships" xmlns:p="http://schemas.openxmlformats.org/presentationml/2006/main">
+  <p:cSld>
     <p:bg>
       <p:bgPr>
         <a:solidFill>
-          <a:srgbClr val="FFFF00"/>
+          <a:schemeClr val="bg1"/>
         </a:solidFill>
         <a:effectLst/>
       </p:bgPr>
@@ -10606,7 +11641,7 @@
           </a:prstGeom>
           <a:extLst>
             <a:ext uri="{C572A759-6A51-4108-AA02-DFA0A04FC94B}">
-              <ma14:wrappingTextBoxFlag xmlns:ma14="http://schemas.microsoft.com/office/mac/drawingml/2011/main" xmlns:a14="http://schemas.microsoft.com/office/drawing/2010/main" xmlns:m="http://schemas.openxmlformats.org/officeDocument/2006/math" xmlns="" val="1"/>
+              <ma14:wrappingTextBoxFlag xmlns="" xmlns:m="http://schemas.openxmlformats.org/officeDocument/2006/math" xmlns:a14="http://schemas.microsoft.com/office/drawing/2010/main" xmlns:ma14="http://schemas.microsoft.com/office/mac/drawingml/2011/main" val="1"/>
             </a:ext>
           </a:extLst>
         </p:spPr>
@@ -10615,7 +11650,7 @@
           <a:lstStyle/>
           <a:p>
             <a:fld id="{86CB4B4D-7CA3-9044-876B-883B54F8677D}" type="slidenum">
-              <a:t>23</a:t>
+              <a:t>24</a:t>
             </a:fld>
             <a:endParaRPr/>
           </a:p>
@@ -10630,13 +11665,13 @@
 </p:sld>
 </file>
 
-<file path=ppt/slides/slide24.xml><?xml version="1.0" encoding="utf-8"?>
+<file path=ppt/slides/slide25.xml><?xml version="1.0" encoding="utf-8"?>
 <p:sld xmlns:a="http://schemas.openxmlformats.org/drawingml/2006/main" xmlns:r="http://schemas.openxmlformats.org/officeDocument/2006/relationships" xmlns:p="http://schemas.openxmlformats.org/presentationml/2006/main">
   <p:cSld>
     <p:bg>
       <p:bgPr>
         <a:solidFill>
-          <a:srgbClr val="FFFF00"/>
+          <a:schemeClr val="bg1"/>
         </a:solidFill>
         <a:effectLst/>
       </p:bgPr>
@@ -10742,7 +11777,7 @@
           </a:ln>
           <a:extLst>
             <a:ext uri="{C572A759-6A51-4108-AA02-DFA0A04FC94B}">
-              <ma14:wrappingTextBoxFlag xmlns:ma14="http://schemas.microsoft.com/office/mac/drawingml/2011/main" xmlns:a14="http://schemas.microsoft.com/office/drawing/2010/main" xmlns:m="http://schemas.openxmlformats.org/officeDocument/2006/math" xmlns="" val="1"/>
+              <ma14:wrappingTextBoxFlag xmlns="" xmlns:m="http://schemas.openxmlformats.org/officeDocument/2006/math" xmlns:a14="http://schemas.microsoft.com/office/drawing/2010/main" xmlns:ma14="http://schemas.microsoft.com/office/mac/drawingml/2011/main" val="1"/>
             </a:ext>
           </a:extLst>
         </p:spPr>
@@ -10778,7 +11813,7 @@
           </a:prstGeom>
           <a:extLst>
             <a:ext uri="{C572A759-6A51-4108-AA02-DFA0A04FC94B}">
-              <ma14:wrappingTextBoxFlag xmlns:ma14="http://schemas.microsoft.com/office/mac/drawingml/2011/main" xmlns:a14="http://schemas.microsoft.com/office/drawing/2010/main" xmlns:m="http://schemas.openxmlformats.org/officeDocument/2006/math" xmlns="" val="1"/>
+              <ma14:wrappingTextBoxFlag xmlns="" xmlns:m="http://schemas.openxmlformats.org/officeDocument/2006/math" xmlns:a14="http://schemas.microsoft.com/office/drawing/2010/main" xmlns:ma14="http://schemas.microsoft.com/office/mac/drawingml/2011/main" val="1"/>
             </a:ext>
           </a:extLst>
         </p:spPr>
@@ -10788,7 +11823,7 @@
           <a:p>
             <a:fld id="{86CB4B4D-7CA3-9044-876B-883B54F8677D}" type="slidenum">
               <a:rPr/>
-              <a:t>24</a:t>
+              <a:t>25</a:t>
             </a:fld>
             <a:endParaRPr/>
           </a:p>
@@ -10805,7 +11840,7 @@
         <p:push dir="u"/>
       </p:transition>
     </mc:Choice>
-    <mc:Fallback xmlns:a14="http://schemas.microsoft.com/office/drawing/2010/main" xmlns:m="http://schemas.openxmlformats.org/officeDocument/2006/math" xmlns="">
+    <mc:Fallback xmlns="" xmlns:m="http://schemas.openxmlformats.org/officeDocument/2006/math" xmlns:a14="http://schemas.microsoft.com/office/drawing/2010/main">
       <p:transition spd="slow">
         <p:fade/>
       </p:transition>
@@ -10820,7 +11855,7 @@
     <p:bg>
       <p:bgPr>
         <a:solidFill>
-          <a:srgbClr val="FFFF00"/>
+          <a:schemeClr val="bg1"/>
         </a:solidFill>
         <a:effectLst/>
       </p:bgPr>
@@ -10924,7 +11959,7 @@
     <p:bg>
       <p:bgPr>
         <a:solidFill>
-          <a:srgbClr val="FFFF00"/>
+          <a:schemeClr val="bg1"/>
         </a:solidFill>
         <a:effectLst/>
       </p:bgPr>
@@ -11026,7 +12061,7 @@
     <p:bg>
       <p:bgPr>
         <a:solidFill>
-          <a:srgbClr val="FFFF00"/>
+          <a:schemeClr val="bg1"/>
         </a:solidFill>
         <a:effectLst/>
       </p:bgPr>
@@ -11165,7 +12200,7 @@
     <p:bg>
       <p:bgPr>
         <a:solidFill>
-          <a:srgbClr val="FFFF00"/>
+          <a:schemeClr val="bg1"/>
         </a:solidFill>
         <a:effectLst/>
       </p:bgPr>
@@ -11273,7 +12308,7 @@
     <p:bg>
       <p:bgPr>
         <a:solidFill>
-          <a:srgbClr val="FFFF00"/>
+          <a:schemeClr val="bg1"/>
         </a:solidFill>
         <a:effectLst/>
       </p:bgPr>
@@ -11385,7 +12420,7 @@
     <p:bg>
       <p:bgPr>
         <a:solidFill>
-          <a:srgbClr val="FFFF00"/>
+          <a:schemeClr val="bg1"/>
         </a:solidFill>
         <a:effectLst/>
       </p:bgPr>
@@ -11491,7 +12526,7 @@
     <p:bg>
       <p:bgPr>
         <a:solidFill>
-          <a:srgbClr val="FFFF00"/>
+          <a:schemeClr val="bg1"/>
         </a:solidFill>
         <a:effectLst/>
       </p:bgPr>

</xml_diff>